<commit_message>
school logo added to presentation
</commit_message>
<xml_diff>
--- a/doc/CanTouchThis-Sunum.pptx
+++ b/doc/CanTouchThis-Sunum.pptx
@@ -2947,6 +2947,42 @@
           </a:p>
         </p:txBody>
       </p:sp>
+      <p:pic>
+        <p:nvPicPr>
+          <p:cNvPr id="6" name="Picture 5">
+            <a:extLst>
+              <a:ext uri="{FF2B5EF4-FFF2-40B4-BE49-F238E27FC236}">
+                <a16:creationId xmlns:a16="http://schemas.microsoft.com/office/drawing/2014/main" id="{CE433CA0-CFC4-43E6-8663-584550014731}"/>
+              </a:ext>
+            </a:extLst>
+          </p:cNvPr>
+          <p:cNvPicPr>
+            <a:picLocks noChangeAspect="1"/>
+          </p:cNvPicPr>
+          <p:nvPr/>
+        </p:nvPicPr>
+        <p:blipFill>
+          <a:blip r:embed="rId3" cstate="email">
+            <a:extLst>
+              <a:ext uri="{28A0092B-C50C-407E-A947-70E740481C1C}">
+                <a14:useLocalDpi xmlns:a14="http://schemas.microsoft.com/office/drawing/2010/main" val="0"/>
+              </a:ext>
+            </a:extLst>
+          </a:blip>
+          <a:stretch>
+            <a:fillRect/>
+          </a:stretch>
+        </p:blipFill>
+        <p:spPr>
+          <a:xfrm>
+            <a:off x="365760" y="11521440"/>
+            <a:ext cx="2906600" cy="1860224"/>
+          </a:xfrm>
+          <a:prstGeom prst="rect">
+            <a:avLst/>
+          </a:prstGeom>
+        </p:spPr>
+      </p:pic>
     </p:spTree>
     <p:extLst>
       <p:ext uri="{BB962C8B-B14F-4D97-AF65-F5344CB8AC3E}">
@@ -3069,6 +3105,42 @@
           </a:p>
         </p:txBody>
       </p:sp>
+      <p:pic>
+        <p:nvPicPr>
+          <p:cNvPr id="6" name="Picture 5">
+            <a:extLst>
+              <a:ext uri="{FF2B5EF4-FFF2-40B4-BE49-F238E27FC236}">
+                <a16:creationId xmlns:a16="http://schemas.microsoft.com/office/drawing/2014/main" id="{8BEA0040-D4DB-46D5-B07D-8889542A46FF}"/>
+              </a:ext>
+            </a:extLst>
+          </p:cNvPr>
+          <p:cNvPicPr>
+            <a:picLocks noChangeAspect="1"/>
+          </p:cNvPicPr>
+          <p:nvPr/>
+        </p:nvPicPr>
+        <p:blipFill>
+          <a:blip r:embed="rId3" cstate="email">
+            <a:extLst>
+              <a:ext uri="{28A0092B-C50C-407E-A947-70E740481C1C}">
+                <a14:useLocalDpi xmlns:a14="http://schemas.microsoft.com/office/drawing/2010/main" val="0"/>
+              </a:ext>
+            </a:extLst>
+          </a:blip>
+          <a:stretch>
+            <a:fillRect/>
+          </a:stretch>
+        </p:blipFill>
+        <p:spPr>
+          <a:xfrm>
+            <a:off x="365760" y="11521440"/>
+            <a:ext cx="2906600" cy="1860224"/>
+          </a:xfrm>
+          <a:prstGeom prst="rect">
+            <a:avLst/>
+          </a:prstGeom>
+        </p:spPr>
+      </p:pic>
     </p:spTree>
     <p:extLst>
       <p:ext uri="{BB962C8B-B14F-4D97-AF65-F5344CB8AC3E}">
@@ -3191,6 +3263,42 @@
           </a:p>
         </p:txBody>
       </p:sp>
+      <p:pic>
+        <p:nvPicPr>
+          <p:cNvPr id="6" name="Picture 5">
+            <a:extLst>
+              <a:ext uri="{FF2B5EF4-FFF2-40B4-BE49-F238E27FC236}">
+                <a16:creationId xmlns:a16="http://schemas.microsoft.com/office/drawing/2014/main" id="{11E45CD8-9F32-4DA0-B0BB-8AD327D1EA24}"/>
+              </a:ext>
+            </a:extLst>
+          </p:cNvPr>
+          <p:cNvPicPr>
+            <a:picLocks noChangeAspect="1"/>
+          </p:cNvPicPr>
+          <p:nvPr/>
+        </p:nvPicPr>
+        <p:blipFill>
+          <a:blip r:embed="rId3" cstate="email">
+            <a:extLst>
+              <a:ext uri="{28A0092B-C50C-407E-A947-70E740481C1C}">
+                <a14:useLocalDpi xmlns:a14="http://schemas.microsoft.com/office/drawing/2010/main" val="0"/>
+              </a:ext>
+            </a:extLst>
+          </a:blip>
+          <a:stretch>
+            <a:fillRect/>
+          </a:stretch>
+        </p:blipFill>
+        <p:spPr>
+          <a:xfrm>
+            <a:off x="365760" y="11521440"/>
+            <a:ext cx="2906600" cy="1860224"/>
+          </a:xfrm>
+          <a:prstGeom prst="rect">
+            <a:avLst/>
+          </a:prstGeom>
+        </p:spPr>
+      </p:pic>
     </p:spTree>
     <p:extLst>
       <p:ext uri="{BB962C8B-B14F-4D97-AF65-F5344CB8AC3E}">
@@ -3559,6 +3667,42 @@
           </a:solidFill>
         </p:spPr>
       </p:pic>
+      <p:pic>
+        <p:nvPicPr>
+          <p:cNvPr id="7" name="Picture 6">
+            <a:extLst>
+              <a:ext uri="{FF2B5EF4-FFF2-40B4-BE49-F238E27FC236}">
+                <a16:creationId xmlns:a16="http://schemas.microsoft.com/office/drawing/2014/main" id="{525B88FF-45F5-4AAD-98B8-28DFE0F14D76}"/>
+              </a:ext>
+            </a:extLst>
+          </p:cNvPr>
+          <p:cNvPicPr>
+            <a:picLocks noChangeAspect="1"/>
+          </p:cNvPicPr>
+          <p:nvPr/>
+        </p:nvPicPr>
+        <p:blipFill>
+          <a:blip r:embed="rId4" cstate="email">
+            <a:extLst>
+              <a:ext uri="{28A0092B-C50C-407E-A947-70E740481C1C}">
+                <a14:useLocalDpi xmlns:a14="http://schemas.microsoft.com/office/drawing/2010/main" val="0"/>
+              </a:ext>
+            </a:extLst>
+          </a:blip>
+          <a:stretch>
+            <a:fillRect/>
+          </a:stretch>
+        </p:blipFill>
+        <p:spPr>
+          <a:xfrm>
+            <a:off x="365760" y="11521440"/>
+            <a:ext cx="2906600" cy="1860224"/>
+          </a:xfrm>
+          <a:prstGeom prst="rect">
+            <a:avLst/>
+          </a:prstGeom>
+        </p:spPr>
+      </p:pic>
     </p:spTree>
     <p:extLst>
       <p:ext uri="{BB962C8B-B14F-4D97-AF65-F5344CB8AC3E}">
@@ -3757,6 +3901,42 @@
               <a:lumMod val="95000"/>
             </a:schemeClr>
           </a:solidFill>
+        </p:spPr>
+      </p:pic>
+      <p:pic>
+        <p:nvPicPr>
+          <p:cNvPr id="8" name="Picture 7">
+            <a:extLst>
+              <a:ext uri="{FF2B5EF4-FFF2-40B4-BE49-F238E27FC236}">
+                <a16:creationId xmlns:a16="http://schemas.microsoft.com/office/drawing/2014/main" id="{173F5523-BEA0-48CA-BCAA-F54FC4D7458A}"/>
+              </a:ext>
+            </a:extLst>
+          </p:cNvPr>
+          <p:cNvPicPr>
+            <a:picLocks noChangeAspect="1"/>
+          </p:cNvPicPr>
+          <p:nvPr/>
+        </p:nvPicPr>
+        <p:blipFill>
+          <a:blip r:embed="rId5" cstate="email">
+            <a:extLst>
+              <a:ext uri="{28A0092B-C50C-407E-A947-70E740481C1C}">
+                <a14:useLocalDpi xmlns:a14="http://schemas.microsoft.com/office/drawing/2010/main" val="0"/>
+              </a:ext>
+            </a:extLst>
+          </a:blip>
+          <a:stretch>
+            <a:fillRect/>
+          </a:stretch>
+        </p:blipFill>
+        <p:spPr>
+          <a:xfrm>
+            <a:off x="365760" y="11521440"/>
+            <a:ext cx="2906600" cy="1860224"/>
+          </a:xfrm>
+          <a:prstGeom prst="rect">
+            <a:avLst/>
+          </a:prstGeom>
         </p:spPr>
       </p:pic>
     </p:spTree>
@@ -4380,6 +4560,42 @@
           </a:p>
         </p:txBody>
       </p:sp>
+      <p:pic>
+        <p:nvPicPr>
+          <p:cNvPr id="6" name="Picture 5">
+            <a:extLst>
+              <a:ext uri="{FF2B5EF4-FFF2-40B4-BE49-F238E27FC236}">
+                <a16:creationId xmlns:a16="http://schemas.microsoft.com/office/drawing/2014/main" id="{254FB237-AE22-48B9-89EF-A34F1826AA73}"/>
+              </a:ext>
+            </a:extLst>
+          </p:cNvPr>
+          <p:cNvPicPr>
+            <a:picLocks noChangeAspect="1"/>
+          </p:cNvPicPr>
+          <p:nvPr/>
+        </p:nvPicPr>
+        <p:blipFill>
+          <a:blip r:embed="rId3" cstate="email">
+            <a:extLst>
+              <a:ext uri="{28A0092B-C50C-407E-A947-70E740481C1C}">
+                <a14:useLocalDpi xmlns:a14="http://schemas.microsoft.com/office/drawing/2010/main" val="0"/>
+              </a:ext>
+            </a:extLst>
+          </a:blip>
+          <a:stretch>
+            <a:fillRect/>
+          </a:stretch>
+        </p:blipFill>
+        <p:spPr>
+          <a:xfrm>
+            <a:off x="365760" y="11521440"/>
+            <a:ext cx="2906600" cy="1860224"/>
+          </a:xfrm>
+          <a:prstGeom prst="rect">
+            <a:avLst/>
+          </a:prstGeom>
+        </p:spPr>
+      </p:pic>
     </p:spTree>
     <p:extLst>
       <p:ext uri="{BB962C8B-B14F-4D97-AF65-F5344CB8AC3E}">
@@ -5839,6 +6055,42 @@
           </p:txBody>
         </p:sp>
       </p:grpSp>
+      <p:pic>
+        <p:nvPicPr>
+          <p:cNvPr id="4" name="Picture 3">
+            <a:extLst>
+              <a:ext uri="{FF2B5EF4-FFF2-40B4-BE49-F238E27FC236}">
+                <a16:creationId xmlns:a16="http://schemas.microsoft.com/office/drawing/2014/main" id="{63AC86D4-85A0-4E44-A31E-6F660E855C6E}"/>
+              </a:ext>
+            </a:extLst>
+          </p:cNvPr>
+          <p:cNvPicPr>
+            <a:picLocks noChangeAspect="1"/>
+          </p:cNvPicPr>
+          <p:nvPr/>
+        </p:nvPicPr>
+        <p:blipFill>
+          <a:blip r:embed="rId3" cstate="email">
+            <a:extLst>
+              <a:ext uri="{28A0092B-C50C-407E-A947-70E740481C1C}">
+                <a14:useLocalDpi xmlns:a14="http://schemas.microsoft.com/office/drawing/2010/main" val="0"/>
+              </a:ext>
+            </a:extLst>
+          </a:blip>
+          <a:stretch>
+            <a:fillRect/>
+          </a:stretch>
+        </p:blipFill>
+        <p:spPr>
+          <a:xfrm>
+            <a:off x="365760" y="11521440"/>
+            <a:ext cx="2906600" cy="1860224"/>
+          </a:xfrm>
+          <a:prstGeom prst="rect">
+            <a:avLst/>
+          </a:prstGeom>
+        </p:spPr>
+      </p:pic>
     </p:spTree>
     <p:extLst>
       <p:ext uri="{BB962C8B-B14F-4D97-AF65-F5344CB8AC3E}">
@@ -8373,6 +8625,42 @@
           </a:p>
         </p:txBody>
       </p:sp>
+      <p:pic>
+        <p:nvPicPr>
+          <p:cNvPr id="20" name="Picture 19">
+            <a:extLst>
+              <a:ext uri="{FF2B5EF4-FFF2-40B4-BE49-F238E27FC236}">
+                <a16:creationId xmlns:a16="http://schemas.microsoft.com/office/drawing/2014/main" id="{7346E3A6-7A03-496D-9DB4-BFA0BB1670C6}"/>
+              </a:ext>
+            </a:extLst>
+          </p:cNvPr>
+          <p:cNvPicPr>
+            <a:picLocks noChangeAspect="1"/>
+          </p:cNvPicPr>
+          <p:nvPr/>
+        </p:nvPicPr>
+        <p:blipFill>
+          <a:blip r:embed="rId2" cstate="email">
+            <a:extLst>
+              <a:ext uri="{28A0092B-C50C-407E-A947-70E740481C1C}">
+                <a14:useLocalDpi xmlns:a14="http://schemas.microsoft.com/office/drawing/2010/main" val="0"/>
+              </a:ext>
+            </a:extLst>
+          </a:blip>
+          <a:stretch>
+            <a:fillRect/>
+          </a:stretch>
+        </p:blipFill>
+        <p:spPr>
+          <a:xfrm>
+            <a:off x="365760" y="11521440"/>
+            <a:ext cx="2906600" cy="1860224"/>
+          </a:xfrm>
+          <a:prstGeom prst="rect">
+            <a:avLst/>
+          </a:prstGeom>
+        </p:spPr>
+      </p:pic>
     </p:spTree>
     <p:extLst>
       <p:ext uri="{BB962C8B-B14F-4D97-AF65-F5344CB8AC3E}">
@@ -11115,6 +11403,42 @@
           </a:p>
         </p:txBody>
       </p:sp>
+      <p:pic>
+        <p:nvPicPr>
+          <p:cNvPr id="12" name="Picture 11">
+            <a:extLst>
+              <a:ext uri="{FF2B5EF4-FFF2-40B4-BE49-F238E27FC236}">
+                <a16:creationId xmlns:a16="http://schemas.microsoft.com/office/drawing/2014/main" id="{4E184C0C-A219-40C1-9F7D-4B3996AD6CCD}"/>
+              </a:ext>
+            </a:extLst>
+          </p:cNvPr>
+          <p:cNvPicPr>
+            <a:picLocks noChangeAspect="1"/>
+          </p:cNvPicPr>
+          <p:nvPr/>
+        </p:nvPicPr>
+        <p:blipFill>
+          <a:blip r:embed="rId2" cstate="email">
+            <a:extLst>
+              <a:ext uri="{28A0092B-C50C-407E-A947-70E740481C1C}">
+                <a14:useLocalDpi xmlns:a14="http://schemas.microsoft.com/office/drawing/2010/main" val="0"/>
+              </a:ext>
+            </a:extLst>
+          </a:blip>
+          <a:stretch>
+            <a:fillRect/>
+          </a:stretch>
+        </p:blipFill>
+        <p:spPr>
+          <a:xfrm>
+            <a:off x="365760" y="11521440"/>
+            <a:ext cx="2906600" cy="1860224"/>
+          </a:xfrm>
+          <a:prstGeom prst="rect">
+            <a:avLst/>
+          </a:prstGeom>
+        </p:spPr>
+      </p:pic>
     </p:spTree>
     <p:extLst>
       <p:ext uri="{BB962C8B-B14F-4D97-AF65-F5344CB8AC3E}">
@@ -13833,6 +14157,42 @@
           </a:p>
         </p:txBody>
       </p:sp>
+      <p:pic>
+        <p:nvPicPr>
+          <p:cNvPr id="21" name="Picture 20">
+            <a:extLst>
+              <a:ext uri="{FF2B5EF4-FFF2-40B4-BE49-F238E27FC236}">
+                <a16:creationId xmlns:a16="http://schemas.microsoft.com/office/drawing/2014/main" id="{4D628734-F851-402B-8AEC-A8C03FECE792}"/>
+              </a:ext>
+            </a:extLst>
+          </p:cNvPr>
+          <p:cNvPicPr>
+            <a:picLocks noChangeAspect="1"/>
+          </p:cNvPicPr>
+          <p:nvPr/>
+        </p:nvPicPr>
+        <p:blipFill>
+          <a:blip r:embed="rId2" cstate="email">
+            <a:extLst>
+              <a:ext uri="{28A0092B-C50C-407E-A947-70E740481C1C}">
+                <a14:useLocalDpi xmlns:a14="http://schemas.microsoft.com/office/drawing/2010/main" val="0"/>
+              </a:ext>
+            </a:extLst>
+          </a:blip>
+          <a:stretch>
+            <a:fillRect/>
+          </a:stretch>
+        </p:blipFill>
+        <p:spPr>
+          <a:xfrm>
+            <a:off x="365760" y="11521440"/>
+            <a:ext cx="2906600" cy="1860224"/>
+          </a:xfrm>
+          <a:prstGeom prst="rect">
+            <a:avLst/>
+          </a:prstGeom>
+        </p:spPr>
+      </p:pic>
     </p:spTree>
     <p:extLst>
       <p:ext uri="{BB962C8B-B14F-4D97-AF65-F5344CB8AC3E}">
@@ -15727,6 +16087,42 @@
           </a:p>
         </p:txBody>
       </p:sp>
+      <p:pic>
+        <p:nvPicPr>
+          <p:cNvPr id="12" name="Picture 11">
+            <a:extLst>
+              <a:ext uri="{FF2B5EF4-FFF2-40B4-BE49-F238E27FC236}">
+                <a16:creationId xmlns:a16="http://schemas.microsoft.com/office/drawing/2014/main" id="{AAC94D81-D9B6-4C78-AB50-0498FD0DA425}"/>
+              </a:ext>
+            </a:extLst>
+          </p:cNvPr>
+          <p:cNvPicPr>
+            <a:picLocks noChangeAspect="1"/>
+          </p:cNvPicPr>
+          <p:nvPr/>
+        </p:nvPicPr>
+        <p:blipFill>
+          <a:blip r:embed="rId2" cstate="email">
+            <a:extLst>
+              <a:ext uri="{28A0092B-C50C-407E-A947-70E740481C1C}">
+                <a14:useLocalDpi xmlns:a14="http://schemas.microsoft.com/office/drawing/2010/main" val="0"/>
+              </a:ext>
+            </a:extLst>
+          </a:blip>
+          <a:stretch>
+            <a:fillRect/>
+          </a:stretch>
+        </p:blipFill>
+        <p:spPr>
+          <a:xfrm>
+            <a:off x="365760" y="11521440"/>
+            <a:ext cx="2906600" cy="1860224"/>
+          </a:xfrm>
+          <a:prstGeom prst="rect">
+            <a:avLst/>
+          </a:prstGeom>
+        </p:spPr>
+      </p:pic>
     </p:spTree>
     <p:extLst>
       <p:ext uri="{BB962C8B-B14F-4D97-AF65-F5344CB8AC3E}">
@@ -19430,6 +19826,42 @@
           </a:p>
         </p:txBody>
       </p:sp>
+      <p:pic>
+        <p:nvPicPr>
+          <p:cNvPr id="23" name="Picture 22">
+            <a:extLst>
+              <a:ext uri="{FF2B5EF4-FFF2-40B4-BE49-F238E27FC236}">
+                <a16:creationId xmlns:a16="http://schemas.microsoft.com/office/drawing/2014/main" id="{A2A8FB15-D2B6-49C5-8C43-DB4BC65DE5D9}"/>
+              </a:ext>
+            </a:extLst>
+          </p:cNvPr>
+          <p:cNvPicPr>
+            <a:picLocks noChangeAspect="1"/>
+          </p:cNvPicPr>
+          <p:nvPr/>
+        </p:nvPicPr>
+        <p:blipFill>
+          <a:blip r:embed="rId2" cstate="email">
+            <a:extLst>
+              <a:ext uri="{28A0092B-C50C-407E-A947-70E740481C1C}">
+                <a14:useLocalDpi xmlns:a14="http://schemas.microsoft.com/office/drawing/2010/main" val="0"/>
+              </a:ext>
+            </a:extLst>
+          </a:blip>
+          <a:stretch>
+            <a:fillRect/>
+          </a:stretch>
+        </p:blipFill>
+        <p:spPr>
+          <a:xfrm>
+            <a:off x="365760" y="11521440"/>
+            <a:ext cx="2906600" cy="1860224"/>
+          </a:xfrm>
+          <a:prstGeom prst="rect">
+            <a:avLst/>
+          </a:prstGeom>
+        </p:spPr>
+      </p:pic>
     </p:spTree>
     <p:extLst>
       <p:ext uri="{BB962C8B-B14F-4D97-AF65-F5344CB8AC3E}">

</xml_diff>